<commit_message>
clarified the point that functions must return values
</commit_message>
<xml_diff>
--- a/PowerPoint Slides/04 - Definition of CPRL.pptx
+++ b/PowerPoint Slides/04 - Definition of CPRL.pptx
@@ -6122,7 +6122,15 @@
           <a:p>
             <a:r>
               <a:rPr lang="en-US" dirty="0"/>
-              <a:t>Similar to procedures except that functions can return values.</a:t>
+              <a:t>Similar to procedures except that </a:t>
+            </a:r>
+            <a:r>
+              <a:rPr lang="en-US"/>
+              <a:t>functions return </a:t>
+            </a:r>
+            <a:r>
+              <a:rPr lang="en-US" dirty="0"/>
+              <a:t>values.</a:t>
             </a:r>
           </a:p>
           <a:p>

</xml_diff>

<commit_message>
minor corrections to one PowerPoint slide
</commit_message>
<xml_diff>
--- a/PowerPoint Slides/04 - Definition of CPRL.pptx
+++ b/PowerPoint Slides/04 - Definition of CPRL.pptx
@@ -6883,7 +6883,19 @@
               <a:rPr lang="en-US" sz="1800" dirty="0">
                 <a:latin typeface="Consolas" panose="020B0609020204030204" pitchFamily="49" charset="0"/>
               </a:rPr>
-              <a:t>function max(x, y : Integer) return Integer is</a:t>
+              <a:t>function max(x </a:t>
+            </a:r>
+            <a:r>
+              <a:rPr lang="en-US" sz="1800">
+                <a:latin typeface="Consolas" panose="020B0609020204030204" pitchFamily="49" charset="0"/>
+              </a:rPr>
+              <a:t>: Integer, </a:t>
+            </a:r>
+            <a:r>
+              <a:rPr lang="en-US" sz="1800" dirty="0">
+                <a:latin typeface="Consolas" panose="020B0609020204030204" pitchFamily="49" charset="0"/>
+              </a:rPr>
+              <a:t>y : Integer) return Integer is</a:t>
             </a:r>
           </a:p>
           <a:p>

</xml_diff>